<commit_message>
Synch Up on 2-5
</commit_message>
<xml_diff>
--- a/Final Project Technology Selection.pptx
+++ b/Final Project Technology Selection.pptx
@@ -266,7 +266,7 @@
           <a:p>
             <a:fld id="{57E8E291-3AAA-4457-B32F-5F1B95138091}" type="datetimeFigureOut">
               <a:rPr lang="en-US" smtClean="0"/>
-              <a:t>2/3/2022</a:t>
+              <a:t>2/5/2022</a:t>
             </a:fld>
             <a:endParaRPr lang="en-US"/>
           </a:p>
@@ -464,7 +464,7 @@
           <a:p>
             <a:fld id="{57E8E291-3AAA-4457-B32F-5F1B95138091}" type="datetimeFigureOut">
               <a:rPr lang="en-US" smtClean="0"/>
-              <a:t>2/3/2022</a:t>
+              <a:t>2/5/2022</a:t>
             </a:fld>
             <a:endParaRPr lang="en-US"/>
           </a:p>
@@ -672,7 +672,7 @@
           <a:p>
             <a:fld id="{57E8E291-3AAA-4457-B32F-5F1B95138091}" type="datetimeFigureOut">
               <a:rPr lang="en-US" smtClean="0"/>
-              <a:t>2/3/2022</a:t>
+              <a:t>2/5/2022</a:t>
             </a:fld>
             <a:endParaRPr lang="en-US"/>
           </a:p>
@@ -870,7 +870,7 @@
           <a:p>
             <a:fld id="{57E8E291-3AAA-4457-B32F-5F1B95138091}" type="datetimeFigureOut">
               <a:rPr lang="en-US" smtClean="0"/>
-              <a:t>2/3/2022</a:t>
+              <a:t>2/5/2022</a:t>
             </a:fld>
             <a:endParaRPr lang="en-US"/>
           </a:p>
@@ -1145,7 +1145,7 @@
           <a:p>
             <a:fld id="{57E8E291-3AAA-4457-B32F-5F1B95138091}" type="datetimeFigureOut">
               <a:rPr lang="en-US" smtClean="0"/>
-              <a:t>2/3/2022</a:t>
+              <a:t>2/5/2022</a:t>
             </a:fld>
             <a:endParaRPr lang="en-US"/>
           </a:p>
@@ -1410,7 +1410,7 @@
           <a:p>
             <a:fld id="{57E8E291-3AAA-4457-B32F-5F1B95138091}" type="datetimeFigureOut">
               <a:rPr lang="en-US" smtClean="0"/>
-              <a:t>2/3/2022</a:t>
+              <a:t>2/5/2022</a:t>
             </a:fld>
             <a:endParaRPr lang="en-US"/>
           </a:p>
@@ -1822,7 +1822,7 @@
           <a:p>
             <a:fld id="{57E8E291-3AAA-4457-B32F-5F1B95138091}" type="datetimeFigureOut">
               <a:rPr lang="en-US" smtClean="0"/>
-              <a:t>2/3/2022</a:t>
+              <a:t>2/5/2022</a:t>
             </a:fld>
             <a:endParaRPr lang="en-US"/>
           </a:p>
@@ -1963,7 +1963,7 @@
           <a:p>
             <a:fld id="{57E8E291-3AAA-4457-B32F-5F1B95138091}" type="datetimeFigureOut">
               <a:rPr lang="en-US" smtClean="0"/>
-              <a:t>2/3/2022</a:t>
+              <a:t>2/5/2022</a:t>
             </a:fld>
             <a:endParaRPr lang="en-US"/>
           </a:p>
@@ -2076,7 +2076,7 @@
           <a:p>
             <a:fld id="{57E8E291-3AAA-4457-B32F-5F1B95138091}" type="datetimeFigureOut">
               <a:rPr lang="en-US" smtClean="0"/>
-              <a:t>2/3/2022</a:t>
+              <a:t>2/5/2022</a:t>
             </a:fld>
             <a:endParaRPr lang="en-US"/>
           </a:p>
@@ -2387,7 +2387,7 @@
           <a:p>
             <a:fld id="{57E8E291-3AAA-4457-B32F-5F1B95138091}" type="datetimeFigureOut">
               <a:rPr lang="en-US" smtClean="0"/>
-              <a:t>2/3/2022</a:t>
+              <a:t>2/5/2022</a:t>
             </a:fld>
             <a:endParaRPr lang="en-US"/>
           </a:p>
@@ -2675,7 +2675,7 @@
           <a:p>
             <a:fld id="{57E8E291-3AAA-4457-B32F-5F1B95138091}" type="datetimeFigureOut">
               <a:rPr lang="en-US" smtClean="0"/>
-              <a:t>2/3/2022</a:t>
+              <a:t>2/5/2022</a:t>
             </a:fld>
             <a:endParaRPr lang="en-US"/>
           </a:p>
@@ -2916,7 +2916,7 @@
           <a:p>
             <a:fld id="{57E8E291-3AAA-4457-B32F-5F1B95138091}" type="datetimeFigureOut">
               <a:rPr lang="en-US" smtClean="0"/>
-              <a:t>2/3/2022</a:t>
+              <a:t>2/5/2022</a:t>
             </a:fld>
             <a:endParaRPr lang="en-US"/>
           </a:p>
@@ -4873,6 +4873,202 @@
       </p:grpSpPr>
       <p:sp>
         <p:nvSpPr>
+          <p:cNvPr id="37" name="Rectangle 36">
+            <a:extLst>
+              <a:ext uri="{FF2B5EF4-FFF2-40B4-BE49-F238E27FC236}">
+                <a16:creationId xmlns:a16="http://schemas.microsoft.com/office/drawing/2014/main" id="{EB7EB47E-F685-4176-A5D9-8B60F3A59532}"/>
+              </a:ext>
+            </a:extLst>
+          </p:cNvPr>
+          <p:cNvSpPr/>
+          <p:nvPr/>
+        </p:nvSpPr>
+        <p:spPr>
+          <a:xfrm>
+            <a:off x="3655719" y="1175814"/>
+            <a:ext cx="4809875" cy="2952656"/>
+          </a:xfrm>
+          <a:prstGeom prst="rect">
+            <a:avLst/>
+          </a:prstGeom>
+          <a:solidFill>
+            <a:srgbClr val="FFFF00"/>
+          </a:solidFill>
+        </p:spPr>
+        <p:style>
+          <a:lnRef idx="2">
+            <a:schemeClr val="accent1">
+              <a:shade val="50000"/>
+            </a:schemeClr>
+          </a:lnRef>
+          <a:fillRef idx="1">
+            <a:schemeClr val="accent1"/>
+          </a:fillRef>
+          <a:effectRef idx="0">
+            <a:schemeClr val="accent1"/>
+          </a:effectRef>
+          <a:fontRef idx="minor">
+            <a:schemeClr val="lt1"/>
+          </a:fontRef>
+        </p:style>
+        <p:txBody>
+          <a:bodyPr rtlCol="0" anchor="ctr"/>
+          <a:lstStyle/>
+          <a:p>
+            <a:pPr algn="ctr"/>
+            <a:endParaRPr lang="en-US"/>
+          </a:p>
+        </p:txBody>
+      </p:sp>
+      <p:sp>
+        <p:nvSpPr>
+          <p:cNvPr id="35" name="Rectangle 34">
+            <a:extLst>
+              <a:ext uri="{FF2B5EF4-FFF2-40B4-BE49-F238E27FC236}">
+                <a16:creationId xmlns:a16="http://schemas.microsoft.com/office/drawing/2014/main" id="{BAA0E342-01E3-4DE5-8CE2-2E43544FD45A}"/>
+              </a:ext>
+            </a:extLst>
+          </p:cNvPr>
+          <p:cNvSpPr/>
+          <p:nvPr/>
+        </p:nvSpPr>
+        <p:spPr>
+          <a:xfrm>
+            <a:off x="7682533" y="4228470"/>
+            <a:ext cx="4460364" cy="2500881"/>
+          </a:xfrm>
+          <a:prstGeom prst="rect">
+            <a:avLst/>
+          </a:prstGeom>
+          <a:solidFill>
+            <a:schemeClr val="accent2"/>
+          </a:solidFill>
+        </p:spPr>
+        <p:style>
+          <a:lnRef idx="2">
+            <a:schemeClr val="accent1">
+              <a:shade val="50000"/>
+            </a:schemeClr>
+          </a:lnRef>
+          <a:fillRef idx="1">
+            <a:schemeClr val="accent1"/>
+          </a:fillRef>
+          <a:effectRef idx="0">
+            <a:schemeClr val="accent1"/>
+          </a:effectRef>
+          <a:fontRef idx="minor">
+            <a:schemeClr val="lt1"/>
+          </a:fontRef>
+        </p:style>
+        <p:txBody>
+          <a:bodyPr rtlCol="0" anchor="ctr"/>
+          <a:lstStyle/>
+          <a:p>
+            <a:pPr algn="ctr"/>
+            <a:endParaRPr lang="en-US"/>
+          </a:p>
+        </p:txBody>
+      </p:sp>
+      <p:sp>
+        <p:nvSpPr>
+          <p:cNvPr id="32" name="Rectangle 31">
+            <a:extLst>
+              <a:ext uri="{FF2B5EF4-FFF2-40B4-BE49-F238E27FC236}">
+                <a16:creationId xmlns:a16="http://schemas.microsoft.com/office/drawing/2014/main" id="{C0052F14-DEAC-4A94-B01C-6D88503C7E8D}"/>
+              </a:ext>
+            </a:extLst>
+          </p:cNvPr>
+          <p:cNvSpPr/>
+          <p:nvPr/>
+        </p:nvSpPr>
+        <p:spPr>
+          <a:xfrm>
+            <a:off x="78083" y="1164918"/>
+            <a:ext cx="3508757" cy="2945955"/>
+          </a:xfrm>
+          <a:prstGeom prst="rect">
+            <a:avLst/>
+          </a:prstGeom>
+          <a:solidFill>
+            <a:schemeClr val="accent2"/>
+          </a:solidFill>
+        </p:spPr>
+        <p:style>
+          <a:lnRef idx="2">
+            <a:schemeClr val="accent1">
+              <a:shade val="50000"/>
+            </a:schemeClr>
+          </a:lnRef>
+          <a:fillRef idx="1">
+            <a:schemeClr val="accent1"/>
+          </a:fillRef>
+          <a:effectRef idx="0">
+            <a:schemeClr val="accent1"/>
+          </a:effectRef>
+          <a:fontRef idx="minor">
+            <a:schemeClr val="lt1"/>
+          </a:fontRef>
+        </p:style>
+        <p:txBody>
+          <a:bodyPr rtlCol="0" anchor="ctr"/>
+          <a:lstStyle/>
+          <a:p>
+            <a:pPr algn="ctr"/>
+            <a:endParaRPr lang="en-US"/>
+          </a:p>
+        </p:txBody>
+      </p:sp>
+      <p:sp>
+        <p:nvSpPr>
+          <p:cNvPr id="6" name="Rectangle 5">
+            <a:extLst>
+              <a:ext uri="{FF2B5EF4-FFF2-40B4-BE49-F238E27FC236}">
+                <a16:creationId xmlns:a16="http://schemas.microsoft.com/office/drawing/2014/main" id="{47C157FB-18F0-4AEF-B536-724F9D199886}"/>
+              </a:ext>
+            </a:extLst>
+          </p:cNvPr>
+          <p:cNvSpPr/>
+          <p:nvPr/>
+        </p:nvSpPr>
+        <p:spPr>
+          <a:xfrm>
+            <a:off x="3167200" y="4208193"/>
+            <a:ext cx="4460364" cy="2500881"/>
+          </a:xfrm>
+          <a:prstGeom prst="rect">
+            <a:avLst/>
+          </a:prstGeom>
+          <a:solidFill>
+            <a:schemeClr val="accent2"/>
+          </a:solidFill>
+        </p:spPr>
+        <p:style>
+          <a:lnRef idx="2">
+            <a:schemeClr val="accent1">
+              <a:shade val="50000"/>
+            </a:schemeClr>
+          </a:lnRef>
+          <a:fillRef idx="1">
+            <a:schemeClr val="accent1"/>
+          </a:fillRef>
+          <a:effectRef idx="0">
+            <a:schemeClr val="accent1"/>
+          </a:effectRef>
+          <a:fontRef idx="minor">
+            <a:schemeClr val="lt1"/>
+          </a:fontRef>
+        </p:style>
+        <p:txBody>
+          <a:bodyPr rtlCol="0" anchor="ctr"/>
+          <a:lstStyle/>
+          <a:p>
+            <a:pPr algn="ctr"/>
+            <a:endParaRPr lang="en-US"/>
+          </a:p>
+        </p:txBody>
+      </p:sp>
+      <p:sp>
+        <p:nvSpPr>
           <p:cNvPr id="19" name="Rectangle: Rounded Corners 18">
             <a:extLst>
               <a:ext uri="{FF2B5EF4-FFF2-40B4-BE49-F238E27FC236}">
@@ -5425,13 +5621,13 @@
         </p:nvCxnSpPr>
         <p:spPr>
           <a:xfrm rot="10800000">
-            <a:off x="1571074" y="1859077"/>
-            <a:ext cx="3239415" cy="349548"/>
+            <a:off x="1571074" y="1859078"/>
+            <a:ext cx="3239415" cy="232389"/>
           </a:xfrm>
           <a:prstGeom prst="bentConnector4">
             <a:avLst>
               <a:gd name="adj1" fmla="val 40464"/>
-              <a:gd name="adj2" fmla="val 165399"/>
+              <a:gd name="adj2" fmla="val 198370"/>
             </a:avLst>
           </a:prstGeom>
           <a:ln>
@@ -5859,12 +6055,12 @@
         </p:nvCxnSpPr>
         <p:spPr>
           <a:xfrm flipH="1">
-            <a:off x="6096000" y="2208625"/>
+            <a:off x="6096000" y="2091466"/>
             <a:ext cx="577953" cy="516312"/>
           </a:xfrm>
           <a:prstGeom prst="bentConnector3">
             <a:avLst>
-              <a:gd name="adj1" fmla="val -39553"/>
+              <a:gd name="adj1" fmla="val -109870"/>
             </a:avLst>
           </a:prstGeom>
           <a:ln>
@@ -5952,7 +6148,7 @@
         </p:blipFill>
         <p:spPr bwMode="auto">
           <a:xfrm>
-            <a:off x="4810488" y="1964310"/>
+            <a:off x="4810488" y="1847151"/>
             <a:ext cx="1863465" cy="488629"/>
           </a:xfrm>
           <a:prstGeom prst="rect">
@@ -6057,53 +6253,6 @@
       </p:sp>
       <p:sp>
         <p:nvSpPr>
-          <p:cNvPr id="6" name="Rectangle 5">
-            <a:extLst>
-              <a:ext uri="{FF2B5EF4-FFF2-40B4-BE49-F238E27FC236}">
-                <a16:creationId xmlns:a16="http://schemas.microsoft.com/office/drawing/2014/main" id="{47C157FB-18F0-4AEF-B536-724F9D199886}"/>
-              </a:ext>
-            </a:extLst>
-          </p:cNvPr>
-          <p:cNvSpPr/>
-          <p:nvPr/>
-        </p:nvSpPr>
-        <p:spPr>
-          <a:xfrm>
-            <a:off x="110836" y="786233"/>
-            <a:ext cx="7516728" cy="5922842"/>
-          </a:xfrm>
-          <a:prstGeom prst="rect">
-            <a:avLst/>
-          </a:prstGeom>
-          <a:noFill/>
-        </p:spPr>
-        <p:style>
-          <a:lnRef idx="2">
-            <a:schemeClr val="accent1">
-              <a:shade val="50000"/>
-            </a:schemeClr>
-          </a:lnRef>
-          <a:fillRef idx="1">
-            <a:schemeClr val="accent1"/>
-          </a:fillRef>
-          <a:effectRef idx="0">
-            <a:schemeClr val="accent1"/>
-          </a:effectRef>
-          <a:fontRef idx="minor">
-            <a:schemeClr val="lt1"/>
-          </a:fontRef>
-        </p:style>
-        <p:txBody>
-          <a:bodyPr rtlCol="0" anchor="ctr"/>
-          <a:lstStyle/>
-          <a:p>
-            <a:pPr algn="ctr"/>
-            <a:endParaRPr lang="en-US"/>
-          </a:p>
-        </p:txBody>
-      </p:sp>
-      <p:sp>
-        <p:nvSpPr>
           <p:cNvPr id="12" name="TextBox 11">
             <a:extLst>
               <a:ext uri="{FF2B5EF4-FFF2-40B4-BE49-F238E27FC236}">
@@ -6172,6 +6321,111 @@
             <a:r>
               <a:rPr lang="en-US" dirty="0"/>
               <a:t>API</a:t>
+            </a:r>
+          </a:p>
+        </p:txBody>
+      </p:sp>
+      <p:sp>
+        <p:nvSpPr>
+          <p:cNvPr id="7" name="TextBox 6">
+            <a:extLst>
+              <a:ext uri="{FF2B5EF4-FFF2-40B4-BE49-F238E27FC236}">
+                <a16:creationId xmlns:a16="http://schemas.microsoft.com/office/drawing/2014/main" id="{36EB1028-2E4B-4F85-AC41-ED493FD0E59E}"/>
+              </a:ext>
+            </a:extLst>
+          </p:cNvPr>
+          <p:cNvSpPr txBox="1"/>
+          <p:nvPr/>
+        </p:nvSpPr>
+        <p:spPr>
+          <a:xfrm>
+            <a:off x="6608925" y="4157526"/>
+            <a:ext cx="885478" cy="369332"/>
+          </a:xfrm>
+          <a:prstGeom prst="rect">
+            <a:avLst/>
+          </a:prstGeom>
+          <a:noFill/>
+        </p:spPr>
+        <p:txBody>
+          <a:bodyPr wrap="square" rtlCol="0">
+            <a:spAutoFit/>
+          </a:bodyPr>
+          <a:lstStyle/>
+          <a:p>
+            <a:r>
+              <a:rPr lang="en-US" dirty="0"/>
+              <a:t>Lev</a:t>
+            </a:r>
+          </a:p>
+        </p:txBody>
+      </p:sp>
+      <p:sp>
+        <p:nvSpPr>
+          <p:cNvPr id="33" name="TextBox 32">
+            <a:extLst>
+              <a:ext uri="{FF2B5EF4-FFF2-40B4-BE49-F238E27FC236}">
+                <a16:creationId xmlns:a16="http://schemas.microsoft.com/office/drawing/2014/main" id="{F839323D-83B5-4FA3-9DB1-66555CAF8AAE}"/>
+              </a:ext>
+            </a:extLst>
+          </p:cNvPr>
+          <p:cNvSpPr txBox="1"/>
+          <p:nvPr/>
+        </p:nvSpPr>
+        <p:spPr>
+          <a:xfrm>
+            <a:off x="2558713" y="1169963"/>
+            <a:ext cx="885478" cy="369332"/>
+          </a:xfrm>
+          <a:prstGeom prst="rect">
+            <a:avLst/>
+          </a:prstGeom>
+          <a:noFill/>
+        </p:spPr>
+        <p:txBody>
+          <a:bodyPr wrap="square" rtlCol="0">
+            <a:spAutoFit/>
+          </a:bodyPr>
+          <a:lstStyle/>
+          <a:p>
+            <a:r>
+              <a:rPr lang="en-US" dirty="0"/>
+              <a:t>Lydia</a:t>
+            </a:r>
+          </a:p>
+        </p:txBody>
+      </p:sp>
+      <p:sp>
+        <p:nvSpPr>
+          <p:cNvPr id="36" name="TextBox 35">
+            <a:extLst>
+              <a:ext uri="{FF2B5EF4-FFF2-40B4-BE49-F238E27FC236}">
+                <a16:creationId xmlns:a16="http://schemas.microsoft.com/office/drawing/2014/main" id="{DC751123-F488-425E-A69E-EAA43C5DD605}"/>
+              </a:ext>
+            </a:extLst>
+          </p:cNvPr>
+          <p:cNvSpPr txBox="1"/>
+          <p:nvPr/>
+        </p:nvSpPr>
+        <p:spPr>
+          <a:xfrm>
+            <a:off x="10746396" y="4178470"/>
+            <a:ext cx="1495131" cy="369332"/>
+          </a:xfrm>
+          <a:prstGeom prst="rect">
+            <a:avLst/>
+          </a:prstGeom>
+          <a:noFill/>
+        </p:spPr>
+        <p:txBody>
+          <a:bodyPr wrap="square" rtlCol="0">
+            <a:spAutoFit/>
+          </a:bodyPr>
+          <a:lstStyle/>
+          <a:p>
+            <a:r>
+              <a:rPr lang="en-US" dirty="0"/>
+              <a:t>Muhammad</a:t>
             </a:r>
           </a:p>
         </p:txBody>

</xml_diff>